<commit_message>
Add presentation before switching branches
</commit_message>
<xml_diff>
--- a/Microsoft Movie Studio Market Analysis.pptx
+++ b/Microsoft Movie Studio Market Analysis.pptx
@@ -6,14 +6,14 @@
   </p:sldMasterIdLst>
   <p:sldIdLst>
     <p:sldId id="256" r:id="rId2"/>
-    <p:sldId id="264" r:id="rId3"/>
-    <p:sldId id="257" r:id="rId4"/>
-    <p:sldId id="258" r:id="rId5"/>
-    <p:sldId id="259" r:id="rId6"/>
-    <p:sldId id="260" r:id="rId7"/>
-    <p:sldId id="261" r:id="rId8"/>
-    <p:sldId id="262" r:id="rId9"/>
-    <p:sldId id="263" r:id="rId10"/>
+    <p:sldId id="257" r:id="rId3"/>
+    <p:sldId id="258" r:id="rId4"/>
+    <p:sldId id="259" r:id="rId5"/>
+    <p:sldId id="260" r:id="rId6"/>
+    <p:sldId id="261" r:id="rId7"/>
+    <p:sldId id="262" r:id="rId8"/>
+    <p:sldId id="263" r:id="rId9"/>
+    <p:sldId id="264" r:id="rId10"/>
   </p:sldIdLst>
   <p:sldSz cx="12192000" cy="6858000"/>
   <p:notesSz cx="6858000" cy="9144000"/>
@@ -3725,7 +3725,7 @@
           <p:cNvPr id="2" name="Title 1">
             <a:extLst>
               <a:ext uri="{FF2B5EF4-FFF2-40B4-BE49-F238E27FC236}">
-                <a16:creationId xmlns:a16="http://schemas.microsoft.com/office/drawing/2014/main" id="{87F2AF2D-018C-2B8F-8D58-FE803D5AC3F8}"/>
+                <a16:creationId xmlns:a16="http://schemas.microsoft.com/office/drawing/2014/main" id="{CB706401-1E81-DFE1-4BCC-AF9F42F19E12}"/>
               </a:ext>
             </a:extLst>
           </p:cNvPr>
@@ -3743,7 +3743,7 @@
           <a:p>
             <a:r>
               <a:rPr lang="en-US" dirty="0"/>
-              <a:t>For more info:</a:t>
+              <a:t>Overview</a:t>
             </a:r>
           </a:p>
         </p:txBody>
@@ -3753,7 +3753,7 @@
           <p:cNvPr id="3" name="Content Placeholder 2">
             <a:extLst>
               <a:ext uri="{FF2B5EF4-FFF2-40B4-BE49-F238E27FC236}">
-                <a16:creationId xmlns:a16="http://schemas.microsoft.com/office/drawing/2014/main" id="{EFE04255-12A7-650D-F6D3-B5D56C26C4AA}"/>
+                <a16:creationId xmlns:a16="http://schemas.microsoft.com/office/drawing/2014/main" id="{BFD95C30-24FD-8390-8D2A-1CF35F153937}"/>
               </a:ext>
             </a:extLst>
           </p:cNvPr>
@@ -3764,38 +3764,66 @@
             <p:ph idx="1"/>
           </p:nvPr>
         </p:nvSpPr>
-        <p:spPr/>
-        <p:txBody>
-          <a:bodyPr/>
-          <a:lstStyle/>
-          <a:p>
+        <p:spPr>
+          <a:xfrm>
+            <a:off x="678180" y="1804988"/>
+            <a:ext cx="10515600" cy="4351338"/>
+          </a:xfrm>
+        </p:spPr>
+        <p:txBody>
+          <a:bodyPr/>
+          <a:lstStyle/>
+          <a:p>
+            <a:pPr>
+              <a:buFont typeface="Wingdings" panose="05000000000000000000" pitchFamily="2" charset="2"/>
+              <a:buChar char="Ø"/>
+            </a:pPr>
             <a:r>
               <a:rPr lang="en-US" dirty="0"/>
-              <a:t>Contact:</a:t>
-            </a:r>
-          </a:p>
-          <a:p>
+              <a:t>This project explore current box office trends to help Microsoft make data driven decision as it enters the original movie production  space.</a:t>
+            </a:r>
+          </a:p>
+          <a:p>
+            <a:pPr>
+              <a:buFont typeface="Wingdings" panose="05000000000000000000" pitchFamily="2" charset="2"/>
+              <a:buChar char="Ø"/>
+            </a:pPr>
             <a:r>
               <a:rPr lang="en-US" dirty="0"/>
-              <a:t>Email[princevalentine879@gmail.com]</a:t>
-            </a:r>
-          </a:p>
-          <a:p>
+              <a:t>Using dataset from IMDB and Box  Office Mojo ,the analysis focuses on genre performance ,run </a:t>
+            </a:r>
+            <a:r>
+              <a:rPr lang="en-US" dirty="0" err="1"/>
+              <a:t>time,audience</a:t>
+            </a:r>
             <a:r>
               <a:rPr lang="en-US" dirty="0"/>
-              <a:t>Git </a:t>
-            </a:r>
-            <a:r>
-              <a:rPr lang="en-US"/>
-              <a:t>Hub []</a:t>
-            </a:r>
+              <a:t> ratings , and gross earnings.</a:t>
+            </a:r>
+          </a:p>
+          <a:p>
+            <a:pPr>
+              <a:buFont typeface="Wingdings" panose="05000000000000000000" pitchFamily="2" charset="2"/>
+              <a:buChar char="Ø"/>
+            </a:pPr>
+            <a:r>
+              <a:rPr lang="en-US" dirty="0"/>
+              <a:t>The goal is to identify profitable film traits to inform strategic content  development.</a:t>
+            </a:r>
+          </a:p>
+          <a:p>
+            <a:pPr>
+              <a:buFont typeface="Wingdings" panose="05000000000000000000" pitchFamily="2" charset="2"/>
+              <a:buChar char="Ø"/>
+            </a:pPr>
+            <a:endParaRPr lang="en-US" dirty="0"/>
           </a:p>
         </p:txBody>
       </p:sp>
     </p:spTree>
     <p:extLst>
       <p:ext uri="{BB962C8B-B14F-4D97-AF65-F5344CB8AC3E}">
-        <p14:creationId xmlns:p14="http://schemas.microsoft.com/office/powerpoint/2010/main" val="436835081"/>
+        <p14:creationId xmlns:p14="http://schemas.microsoft.com/office/powerpoint/2010/main" val="3152142371"/>
       </p:ext>
     </p:extLst>
   </p:cSld>
@@ -3827,7 +3855,7 @@
           <p:cNvPr id="2" name="Title 1">
             <a:extLst>
               <a:ext uri="{FF2B5EF4-FFF2-40B4-BE49-F238E27FC236}">
-                <a16:creationId xmlns:a16="http://schemas.microsoft.com/office/drawing/2014/main" id="{CB706401-1E81-DFE1-4BCC-AF9F42F19E12}"/>
+                <a16:creationId xmlns:a16="http://schemas.microsoft.com/office/drawing/2014/main" id="{85D67D84-B235-0875-EC33-51D2F05FBCD1}"/>
               </a:ext>
             </a:extLst>
           </p:cNvPr>
@@ -3845,7 +3873,7 @@
           <a:p>
             <a:r>
               <a:rPr lang="en-US" dirty="0"/>
-              <a:t>Overview</a:t>
+              <a:t>Business Problem</a:t>
             </a:r>
           </a:p>
         </p:txBody>
@@ -3855,7 +3883,7 @@
           <p:cNvPr id="3" name="Content Placeholder 2">
             <a:extLst>
               <a:ext uri="{FF2B5EF4-FFF2-40B4-BE49-F238E27FC236}">
-                <a16:creationId xmlns:a16="http://schemas.microsoft.com/office/drawing/2014/main" id="{BFD95C30-24FD-8390-8D2A-1CF35F153937}"/>
+                <a16:creationId xmlns:a16="http://schemas.microsoft.com/office/drawing/2014/main" id="{0597F651-5D1E-78CF-A791-DBA700571539}"/>
               </a:ext>
             </a:extLst>
           </p:cNvPr>
@@ -3866,14 +3894,11 @@
             <p:ph idx="1"/>
           </p:nvPr>
         </p:nvSpPr>
-        <p:spPr>
-          <a:xfrm>
-            <a:off x="678180" y="1804988"/>
-            <a:ext cx="10515600" cy="4351338"/>
-          </a:xfrm>
-        </p:spPr>
-        <p:txBody>
-          <a:bodyPr/>
+        <p:spPr/>
+        <p:txBody>
+          <a:bodyPr>
+            <a:normAutofit lnSpcReduction="10000"/>
+          </a:bodyPr>
           <a:lstStyle/>
           <a:p>
             <a:pPr>
@@ -3882,7 +3907,7 @@
             </a:pPr>
             <a:r>
               <a:rPr lang="en-US" dirty="0"/>
-              <a:t>This project explore current box office trends to help Microsoft make data driven decision as it enters the original movie production  space.</a:t>
+              <a:t>Microsoft is launching a new movie  studio but  lucks insight into what type of movies perform best commercially.</a:t>
             </a:r>
           </a:p>
           <a:p>
@@ -3892,40 +3917,42 @@
             </a:pPr>
             <a:r>
               <a:rPr lang="en-US" dirty="0"/>
-              <a:t>Using dataset from IMDB and Box  Office Mojo ,the analysis focuses on genre performance ,run </a:t>
-            </a:r>
-            <a:r>
-              <a:rPr lang="en-US" dirty="0" err="1"/>
-              <a:t>time,audience</a:t>
-            </a:r>
+              <a:t>Understanding genre trends , runtime preferences , and audience reception can guide investment into films  that maximize both critical and financial success.</a:t>
+            </a:r>
+          </a:p>
+          <a:p>
+            <a:pPr marL="0" indent="0">
+              <a:buNone/>
+            </a:pPr>
             <a:r>
               <a:rPr lang="en-US" dirty="0"/>
-              <a:t> ratings , and gross earnings.</a:t>
-            </a:r>
-          </a:p>
-          <a:p>
-            <a:pPr>
-              <a:buFont typeface="Wingdings" panose="05000000000000000000" pitchFamily="2" charset="2"/>
-              <a:buChar char="Ø"/>
-            </a:pPr>
+              <a:t>Business Questions:</a:t>
+            </a:r>
+          </a:p>
+          <a:p>
             <a:r>
               <a:rPr lang="en-US" dirty="0"/>
-              <a:t>The goal is to identify profitable film traits to inform strategic content  development.</a:t>
-            </a:r>
-          </a:p>
-          <a:p>
-            <a:pPr>
-              <a:buFont typeface="Wingdings" panose="05000000000000000000" pitchFamily="2" charset="2"/>
-              <a:buChar char="Ø"/>
-            </a:pPr>
-            <a:endParaRPr lang="en-US" dirty="0"/>
+              <a:t>What type of movies generate the most revenue?</a:t>
+            </a:r>
+          </a:p>
+          <a:p>
+            <a:r>
+              <a:rPr lang="en-US" dirty="0"/>
+              <a:t>Do audience rating and number of votes correlate with higher gross?</a:t>
+            </a:r>
+          </a:p>
+          <a:p>
+            <a:r>
+              <a:rPr lang="en-US" dirty="0"/>
+              <a:t>How do gender and release year influence box office performance?</a:t>
+            </a:r>
           </a:p>
         </p:txBody>
       </p:sp>
     </p:spTree>
     <p:extLst>
       <p:ext uri="{BB962C8B-B14F-4D97-AF65-F5344CB8AC3E}">
-        <p14:creationId xmlns:p14="http://schemas.microsoft.com/office/powerpoint/2010/main" val="3152142371"/>
+        <p14:creationId xmlns:p14="http://schemas.microsoft.com/office/powerpoint/2010/main" val="4183187988"/>
       </p:ext>
     </p:extLst>
   </p:cSld>
@@ -3957,7 +3984,7 @@
           <p:cNvPr id="2" name="Title 1">
             <a:extLst>
               <a:ext uri="{FF2B5EF4-FFF2-40B4-BE49-F238E27FC236}">
-                <a16:creationId xmlns:a16="http://schemas.microsoft.com/office/drawing/2014/main" id="{85D67D84-B235-0875-EC33-51D2F05FBCD1}"/>
+                <a16:creationId xmlns:a16="http://schemas.microsoft.com/office/drawing/2014/main" id="{F872834B-A367-3367-91E3-18581CB5F30D}"/>
               </a:ext>
             </a:extLst>
           </p:cNvPr>
@@ -3975,7 +4002,7 @@
           <a:p>
             <a:r>
               <a:rPr lang="en-US" dirty="0"/>
-              <a:t>Business Problem</a:t>
+              <a:t>Data</a:t>
             </a:r>
           </a:p>
         </p:txBody>
@@ -3985,7 +4012,7 @@
           <p:cNvPr id="3" name="Content Placeholder 2">
             <a:extLst>
               <a:ext uri="{FF2B5EF4-FFF2-40B4-BE49-F238E27FC236}">
-                <a16:creationId xmlns:a16="http://schemas.microsoft.com/office/drawing/2014/main" id="{0597F651-5D1E-78CF-A791-DBA700571539}"/>
+                <a16:creationId xmlns:a16="http://schemas.microsoft.com/office/drawing/2014/main" id="{5A234037-29F3-2C5B-2506-9B2915116CC2}"/>
               </a:ext>
             </a:extLst>
           </p:cNvPr>
@@ -3998,55 +4025,33 @@
         </p:nvSpPr>
         <p:spPr/>
         <p:txBody>
-          <a:bodyPr>
-            <a:normAutofit lnSpcReduction="10000"/>
-          </a:bodyPr>
-          <a:lstStyle/>
-          <a:p>
-            <a:pPr>
-              <a:buFont typeface="Wingdings" panose="05000000000000000000" pitchFamily="2" charset="2"/>
-              <a:buChar char="Ø"/>
+          <a:bodyPr/>
+          <a:lstStyle/>
+          <a:p>
+            <a:pPr marL="0" indent="0">
+              <a:buNone/>
             </a:pPr>
             <a:r>
               <a:rPr lang="en-US" dirty="0"/>
-              <a:t>Microsoft is launching a new movie  studio but  lucks insight into what type of movies perform best commercially.</a:t>
-            </a:r>
-          </a:p>
-          <a:p>
-            <a:pPr>
-              <a:buFont typeface="Wingdings" panose="05000000000000000000" pitchFamily="2" charset="2"/>
-              <a:buChar char="Ø"/>
-            </a:pPr>
+              <a:t>Data sources:</a:t>
+            </a:r>
+          </a:p>
+          <a:p>
             <a:r>
               <a:rPr lang="en-US" dirty="0"/>
-              <a:t>Understanding genre trends , runtime preferences , and audience reception can guide investment into films  that maximize both critical and financial success.</a:t>
-            </a:r>
-          </a:p>
-          <a:p>
-            <a:pPr marL="0" indent="0">
-              <a:buNone/>
-            </a:pPr>
+              <a:t>imdb.title.basics.tsv.gz : Title, genre, runtime, year</a:t>
+            </a:r>
+          </a:p>
+          <a:p>
             <a:r>
               <a:rPr lang="en-US" dirty="0"/>
-              <a:t>Business Questions:</a:t>
+              <a:t>imdb.title.ratings.tsv.gz : Average rating , number of votes</a:t>
             </a:r>
           </a:p>
           <a:p>
             <a:r>
               <a:rPr lang="en-US" dirty="0"/>
-              <a:t>What type of movies generate the most revenue?</a:t>
-            </a:r>
-          </a:p>
-          <a:p>
-            <a:r>
-              <a:rPr lang="en-US" dirty="0"/>
-              <a:t>Do audience rating and number of votes correlate with higher gross?</a:t>
-            </a:r>
-          </a:p>
-          <a:p>
-            <a:r>
-              <a:rPr lang="en-US" dirty="0"/>
-              <a:t>How do gender and release year influence box office performance?</a:t>
+              <a:t>bom.movie_gross.csv : Domestic and foreign gross revenue</a:t>
             </a:r>
           </a:p>
         </p:txBody>
@@ -4054,7 +4059,7 @@
     </p:spTree>
     <p:extLst>
       <p:ext uri="{BB962C8B-B14F-4D97-AF65-F5344CB8AC3E}">
-        <p14:creationId xmlns:p14="http://schemas.microsoft.com/office/powerpoint/2010/main" val="4183187988"/>
+        <p14:creationId xmlns:p14="http://schemas.microsoft.com/office/powerpoint/2010/main" val="685563817"/>
       </p:ext>
     </p:extLst>
   </p:cSld>
@@ -4086,113 +4091,6 @@
           <p:cNvPr id="2" name="Title 1">
             <a:extLst>
               <a:ext uri="{FF2B5EF4-FFF2-40B4-BE49-F238E27FC236}">
-                <a16:creationId xmlns:a16="http://schemas.microsoft.com/office/drawing/2014/main" id="{F872834B-A367-3367-91E3-18581CB5F30D}"/>
-              </a:ext>
-            </a:extLst>
-          </p:cNvPr>
-          <p:cNvSpPr>
-            <a:spLocks noGrp="1"/>
-          </p:cNvSpPr>
-          <p:nvPr>
-            <p:ph type="title"/>
-          </p:nvPr>
-        </p:nvSpPr>
-        <p:spPr/>
-        <p:txBody>
-          <a:bodyPr/>
-          <a:lstStyle/>
-          <a:p>
-            <a:r>
-              <a:rPr lang="en-US" dirty="0"/>
-              <a:t>Data</a:t>
-            </a:r>
-          </a:p>
-        </p:txBody>
-      </p:sp>
-      <p:sp>
-        <p:nvSpPr>
-          <p:cNvPr id="3" name="Content Placeholder 2">
-            <a:extLst>
-              <a:ext uri="{FF2B5EF4-FFF2-40B4-BE49-F238E27FC236}">
-                <a16:creationId xmlns:a16="http://schemas.microsoft.com/office/drawing/2014/main" id="{5A234037-29F3-2C5B-2506-9B2915116CC2}"/>
-              </a:ext>
-            </a:extLst>
-          </p:cNvPr>
-          <p:cNvSpPr>
-            <a:spLocks noGrp="1"/>
-          </p:cNvSpPr>
-          <p:nvPr>
-            <p:ph idx="1"/>
-          </p:nvPr>
-        </p:nvSpPr>
-        <p:spPr/>
-        <p:txBody>
-          <a:bodyPr/>
-          <a:lstStyle/>
-          <a:p>
-            <a:pPr marL="0" indent="0">
-              <a:buNone/>
-            </a:pPr>
-            <a:r>
-              <a:rPr lang="en-US" dirty="0"/>
-              <a:t>Data sources:</a:t>
-            </a:r>
-          </a:p>
-          <a:p>
-            <a:r>
-              <a:rPr lang="en-US" dirty="0"/>
-              <a:t>imdb.title.basics.tsv.gz : Title, genre, runtime, year</a:t>
-            </a:r>
-          </a:p>
-          <a:p>
-            <a:r>
-              <a:rPr lang="en-US" dirty="0"/>
-              <a:t>imdb.title.ratings.tsv.gz : Average rating , number of votes</a:t>
-            </a:r>
-          </a:p>
-          <a:p>
-            <a:r>
-              <a:rPr lang="en-US" dirty="0"/>
-              <a:t>bom.movie_gross.csv : Domestic and foreign gross revenue</a:t>
-            </a:r>
-          </a:p>
-        </p:txBody>
-      </p:sp>
-    </p:spTree>
-    <p:extLst>
-      <p:ext uri="{BB962C8B-B14F-4D97-AF65-F5344CB8AC3E}">
-        <p14:creationId xmlns:p14="http://schemas.microsoft.com/office/powerpoint/2010/main" val="685563817"/>
-      </p:ext>
-    </p:extLst>
-  </p:cSld>
-  <p:clrMapOvr>
-    <a:masterClrMapping/>
-  </p:clrMapOvr>
-</p:sld>
-</file>
-
-<file path=ppt/slides/slide6.xml><?xml version="1.0" encoding="utf-8"?>
-<p:sld xmlns:a="http://schemas.openxmlformats.org/drawingml/2006/main" xmlns:r="http://schemas.openxmlformats.org/officeDocument/2006/relationships" xmlns:p="http://schemas.openxmlformats.org/presentationml/2006/main">
-  <p:cSld>
-    <p:spTree>
-      <p:nvGrpSpPr>
-        <p:cNvPr id="1" name=""/>
-        <p:cNvGrpSpPr/>
-        <p:nvPr/>
-      </p:nvGrpSpPr>
-      <p:grpSpPr>
-        <a:xfrm>
-          <a:off x="0" y="0"/>
-          <a:ext cx="0" cy="0"/>
-          <a:chOff x="0" y="0"/>
-          <a:chExt cx="0" cy="0"/>
-        </a:xfrm>
-      </p:grpSpPr>
-      <p:sp>
-        <p:nvSpPr>
-          <p:cNvPr id="2" name="Title 1">
-            <a:extLst>
-              <a:ext uri="{FF2B5EF4-FFF2-40B4-BE49-F238E27FC236}">
                 <a16:creationId xmlns:a16="http://schemas.microsoft.com/office/drawing/2014/main" id="{B42D9BAB-FC09-AEAC-E6AC-A68C0C83F116}"/>
               </a:ext>
             </a:extLst>
@@ -4314,7 +4212,7 @@
 </p:sld>
 </file>
 
-<file path=ppt/slides/slide7.xml><?xml version="1.0" encoding="utf-8"?>
+<file path=ppt/slides/slide6.xml><?xml version="1.0" encoding="utf-8"?>
 <p:sld xmlns:a="http://schemas.openxmlformats.org/drawingml/2006/main" xmlns:r="http://schemas.openxmlformats.org/officeDocument/2006/relationships" xmlns:p="http://schemas.openxmlformats.org/presentationml/2006/main">
   <p:cSld>
     <p:spTree>
@@ -4407,7 +4305,7 @@
 </p:sld>
 </file>
 
-<file path=ppt/slides/slide8.xml><?xml version="1.0" encoding="utf-8"?>
+<file path=ppt/slides/slide7.xml><?xml version="1.0" encoding="utf-8"?>
 <p:sld xmlns:a="http://schemas.openxmlformats.org/drawingml/2006/main" xmlns:r="http://schemas.openxmlformats.org/officeDocument/2006/relationships" xmlns:p="http://schemas.openxmlformats.org/presentationml/2006/main">
   <p:cSld>
     <p:spTree>
@@ -4500,6 +4398,156 @@
 </p:sld>
 </file>
 
+<file path=ppt/slides/slide8.xml><?xml version="1.0" encoding="utf-8"?>
+<p:sld xmlns:a="http://schemas.openxmlformats.org/drawingml/2006/main" xmlns:r="http://schemas.openxmlformats.org/officeDocument/2006/relationships" xmlns:p="http://schemas.openxmlformats.org/presentationml/2006/main">
+  <p:cSld>
+    <p:spTree>
+      <p:nvGrpSpPr>
+        <p:cNvPr id="1" name=""/>
+        <p:cNvGrpSpPr/>
+        <p:nvPr/>
+      </p:nvGrpSpPr>
+      <p:grpSpPr>
+        <a:xfrm>
+          <a:off x="0" y="0"/>
+          <a:ext cx="0" cy="0"/>
+          <a:chOff x="0" y="0"/>
+          <a:chExt cx="0" cy="0"/>
+        </a:xfrm>
+      </p:grpSpPr>
+      <p:sp>
+        <p:nvSpPr>
+          <p:cNvPr id="2" name="Title 1">
+            <a:extLst>
+              <a:ext uri="{FF2B5EF4-FFF2-40B4-BE49-F238E27FC236}">
+                <a16:creationId xmlns:a16="http://schemas.microsoft.com/office/drawing/2014/main" id="{9386DC67-D43E-61E7-346B-3503B1B688DB}"/>
+              </a:ext>
+            </a:extLst>
+          </p:cNvPr>
+          <p:cNvSpPr>
+            <a:spLocks noGrp="1"/>
+          </p:cNvSpPr>
+          <p:nvPr>
+            <p:ph type="title"/>
+          </p:nvPr>
+        </p:nvSpPr>
+        <p:spPr/>
+        <p:txBody>
+          <a:bodyPr/>
+          <a:lstStyle/>
+          <a:p>
+            <a:r>
+              <a:rPr lang="en-US" dirty="0"/>
+              <a:t>Conclusions</a:t>
+            </a:r>
+          </a:p>
+        </p:txBody>
+      </p:sp>
+      <p:sp>
+        <p:nvSpPr>
+          <p:cNvPr id="3" name="Content Placeholder 2">
+            <a:extLst>
+              <a:ext uri="{FF2B5EF4-FFF2-40B4-BE49-F238E27FC236}">
+                <a16:creationId xmlns:a16="http://schemas.microsoft.com/office/drawing/2014/main" id="{CD189C8E-241B-3897-B6BA-FA5157DE2B69}"/>
+              </a:ext>
+            </a:extLst>
+          </p:cNvPr>
+          <p:cNvSpPr>
+            <a:spLocks noGrp="1"/>
+          </p:cNvSpPr>
+          <p:nvPr>
+            <p:ph idx="1"/>
+          </p:nvPr>
+        </p:nvSpPr>
+        <p:spPr>
+          <a:xfrm>
+            <a:off x="838200" y="1825625"/>
+            <a:ext cx="10515600" cy="4667250"/>
+          </a:xfrm>
+        </p:spPr>
+        <p:txBody>
+          <a:bodyPr>
+            <a:normAutofit lnSpcReduction="10000"/>
+          </a:bodyPr>
+          <a:lstStyle/>
+          <a:p>
+            <a:pPr marL="0" indent="0">
+              <a:buNone/>
+            </a:pPr>
+            <a:r>
+              <a:rPr lang="en-US" dirty="0"/>
+              <a:t>Recommendations  for Microsoft:</a:t>
+            </a:r>
+          </a:p>
+          <a:p>
+            <a:r>
+              <a:rPr lang="en-US" dirty="0"/>
+              <a:t>Focus on Action ,Adventure , and Biography genres to increase potentials</a:t>
+            </a:r>
+          </a:p>
+          <a:p>
+            <a:r>
+              <a:rPr lang="en-US" dirty="0"/>
+              <a:t>Support genres decisions with market trends data  but also asses long term sustainability beyond blockbuster outliers</a:t>
+            </a:r>
+          </a:p>
+          <a:p>
+            <a:r>
+              <a:rPr lang="en-US" dirty="0"/>
+              <a:t>Consider highly rated and frequently voted titles as signal of appeal</a:t>
+            </a:r>
+          </a:p>
+          <a:p>
+            <a:pPr marL="0" indent="0">
+              <a:buNone/>
+            </a:pPr>
+            <a:r>
+              <a:rPr lang="en-US" dirty="0"/>
+              <a:t>Limitations</a:t>
+            </a:r>
+          </a:p>
+          <a:p>
+            <a:r>
+              <a:rPr lang="en-US" dirty="0"/>
+              <a:t>Data limited to films with complete financial  information</a:t>
+            </a:r>
+          </a:p>
+          <a:p>
+            <a:r>
+              <a:rPr lang="en-US" dirty="0"/>
+              <a:t>No access to production  budget or streaming metrics</a:t>
+            </a:r>
+          </a:p>
+          <a:p>
+            <a:pPr marL="0" indent="0">
+              <a:buNone/>
+            </a:pPr>
+            <a:r>
+              <a:rPr lang="en-US" dirty="0"/>
+              <a:t>Next Steps</a:t>
+            </a:r>
+          </a:p>
+          <a:p>
+            <a:r>
+              <a:rPr lang="en-US" dirty="0"/>
+              <a:t>Predict revenue using  regression models on cleaned features</a:t>
+            </a:r>
+          </a:p>
+        </p:txBody>
+      </p:sp>
+    </p:spTree>
+    <p:extLst>
+      <p:ext uri="{BB962C8B-B14F-4D97-AF65-F5344CB8AC3E}">
+        <p14:creationId xmlns:p14="http://schemas.microsoft.com/office/powerpoint/2010/main" val="1724046131"/>
+      </p:ext>
+    </p:extLst>
+  </p:cSld>
+  <p:clrMapOvr>
+    <a:masterClrMapping/>
+  </p:clrMapOvr>
+</p:sld>
+</file>
+
 <file path=ppt/slides/slide9.xml><?xml version="1.0" encoding="utf-8"?>
 <p:sld xmlns:a="http://schemas.openxmlformats.org/drawingml/2006/main" xmlns:r="http://schemas.openxmlformats.org/officeDocument/2006/relationships" xmlns:p="http://schemas.openxmlformats.org/presentationml/2006/main">
   <p:cSld>
@@ -4522,7 +4570,7 @@
           <p:cNvPr id="2" name="Title 1">
             <a:extLst>
               <a:ext uri="{FF2B5EF4-FFF2-40B4-BE49-F238E27FC236}">
-                <a16:creationId xmlns:a16="http://schemas.microsoft.com/office/drawing/2014/main" id="{9386DC67-D43E-61E7-346B-3503B1B688DB}"/>
+                <a16:creationId xmlns:a16="http://schemas.microsoft.com/office/drawing/2014/main" id="{87F2AF2D-018C-2B8F-8D58-FE803D5AC3F8}"/>
               </a:ext>
             </a:extLst>
           </p:cNvPr>
@@ -4540,7 +4588,7 @@
           <a:p>
             <a:r>
               <a:rPr lang="en-US" dirty="0"/>
-              <a:t>Conclusions</a:t>
+              <a:t>For more info:</a:t>
             </a:r>
           </a:p>
         </p:txBody>
@@ -4550,7 +4598,7 @@
           <p:cNvPr id="3" name="Content Placeholder 2">
             <a:extLst>
               <a:ext uri="{FF2B5EF4-FFF2-40B4-BE49-F238E27FC236}">
-                <a16:creationId xmlns:a16="http://schemas.microsoft.com/office/drawing/2014/main" id="{CD189C8E-241B-3897-B6BA-FA5157DE2B69}"/>
+                <a16:creationId xmlns:a16="http://schemas.microsoft.com/office/drawing/2014/main" id="{EFE04255-12A7-650D-F6D3-B5D56C26C4AA}"/>
               </a:ext>
             </a:extLst>
           </p:cNvPr>
@@ -4561,78 +4609,26 @@
             <p:ph idx="1"/>
           </p:nvPr>
         </p:nvSpPr>
-        <p:spPr>
-          <a:xfrm>
-            <a:off x="838200" y="1825625"/>
-            <a:ext cx="10515600" cy="4667250"/>
-          </a:xfrm>
-        </p:spPr>
-        <p:txBody>
-          <a:bodyPr>
-            <a:normAutofit lnSpcReduction="10000"/>
-          </a:bodyPr>
-          <a:lstStyle/>
-          <a:p>
-            <a:pPr marL="0" indent="0">
-              <a:buNone/>
-            </a:pPr>
+        <p:spPr/>
+        <p:txBody>
+          <a:bodyPr/>
+          <a:lstStyle/>
+          <a:p>
             <a:r>
               <a:rPr lang="en-US" dirty="0"/>
-              <a:t>Recommendations  for Microsoft:</a:t>
+              <a:t>Contact:</a:t>
             </a:r>
           </a:p>
           <a:p>
             <a:r>
               <a:rPr lang="en-US" dirty="0"/>
-              <a:t>Focus on Action ,Adventure , and Biography genres to increase potentials</a:t>
+              <a:t>Email[princevalentine879@gmail.com]</a:t>
             </a:r>
           </a:p>
           <a:p>
             <a:r>
               <a:rPr lang="en-US" dirty="0"/>
-              <a:t>Support genres decisions with market trends data  but also asses long term sustainability beyond blockbuster outliers</a:t>
-            </a:r>
-          </a:p>
-          <a:p>
-            <a:r>
-              <a:rPr lang="en-US" dirty="0"/>
-              <a:t>Consider highly rated and frequently voted titles as signal of appeal</a:t>
-            </a:r>
-          </a:p>
-          <a:p>
-            <a:pPr marL="0" indent="0">
-              <a:buNone/>
-            </a:pPr>
-            <a:r>
-              <a:rPr lang="en-US" dirty="0"/>
-              <a:t>Limitations</a:t>
-            </a:r>
-          </a:p>
-          <a:p>
-            <a:r>
-              <a:rPr lang="en-US" dirty="0"/>
-              <a:t>Data limited to films with complete financial  information</a:t>
-            </a:r>
-          </a:p>
-          <a:p>
-            <a:r>
-              <a:rPr lang="en-US" dirty="0"/>
-              <a:t>No access to production  budget or streaming metrics</a:t>
-            </a:r>
-          </a:p>
-          <a:p>
-            <a:pPr marL="0" indent="0">
-              <a:buNone/>
-            </a:pPr>
-            <a:r>
-              <a:rPr lang="en-US" dirty="0"/>
-              <a:t>Next Steps</a:t>
-            </a:r>
-          </a:p>
-          <a:p>
-            <a:r>
-              <a:rPr lang="en-US" dirty="0"/>
-              <a:t>Predict revenue using  regression models on cleaned features</a:t>
+              <a:t>Git Hub []</a:t>
             </a:r>
           </a:p>
         </p:txBody>
@@ -4640,7 +4636,7 @@
     </p:spTree>
     <p:extLst>
       <p:ext uri="{BB962C8B-B14F-4D97-AF65-F5344CB8AC3E}">
-        <p14:creationId xmlns:p14="http://schemas.microsoft.com/office/powerpoint/2010/main" val="1724046131"/>
+        <p14:creationId xmlns:p14="http://schemas.microsoft.com/office/powerpoint/2010/main" val="436835081"/>
       </p:ext>
     </p:extLst>
   </p:cSld>

</xml_diff>